<commit_message>
Update TESM E-Sporter Manager.pptx
</commit_message>
<xml_diff>
--- a/TESM E-Sporter Manager.pptx
+++ b/TESM E-Sporter Manager.pptx
@@ -7242,10 +7242,10 @@
       </p:sp>
       <p:sp>
         <p:nvSpPr>
-          <p:cNvPr id="5" name="ZoneTexte 4">
+          <p:cNvPr id="4" name="ZoneTexte 3">
             <a:extLst>
               <a:ext uri="{FF2B5EF4-FFF2-40B4-BE49-F238E27FC236}">
-                <a16:creationId xmlns:a16="http://schemas.microsoft.com/office/drawing/2014/main" id="{1F37CFFB-FB7B-72CF-1200-530604028B94}"/>
+                <a16:creationId xmlns:a16="http://schemas.microsoft.com/office/drawing/2014/main" id="{2F9B3FF2-A10F-B891-0F26-C9659CCD6781}"/>
               </a:ext>
             </a:extLst>
           </p:cNvPr>
@@ -7254,7 +7254,7 @@
         </p:nvSpPr>
         <p:spPr>
           <a:xfrm>
-            <a:off x="1090536" y="1981443"/>
+            <a:off x="1090536" y="2077682"/>
             <a:ext cx="6083996" cy="523220"/>
           </a:xfrm>
           <a:prstGeom prst="rect">
@@ -7387,53 +7387,6 @@
       </p:sp>
       <p:sp>
         <p:nvSpPr>
-          <p:cNvPr id="5" name="ZoneTexte 4">
-            <a:extLst>
-              <a:ext uri="{FF2B5EF4-FFF2-40B4-BE49-F238E27FC236}">
-                <a16:creationId xmlns:a16="http://schemas.microsoft.com/office/drawing/2014/main" id="{1F37CFFB-FB7B-72CF-1200-530604028B94}"/>
-              </a:ext>
-            </a:extLst>
-          </p:cNvPr>
-          <p:cNvSpPr txBox="1"/>
-          <p:nvPr/>
-        </p:nvSpPr>
-        <p:spPr>
-          <a:xfrm>
-            <a:off x="1090536" y="1981443"/>
-            <a:ext cx="6083996" cy="523220"/>
-          </a:xfrm>
-          <a:prstGeom prst="rect">
-            <a:avLst/>
-          </a:prstGeom>
-          <a:noFill/>
-        </p:spPr>
-        <p:txBody>
-          <a:bodyPr wrap="square" rtlCol="0">
-            <a:spAutoFit/>
-          </a:bodyPr>
-          <a:lstStyle/>
-          <a:p>
-            <a:r>
-              <a:rPr lang="en-US" sz="2800" dirty="0" err="1"/>
-              <a:t>Titouan</a:t>
-            </a:r>
-            <a:r>
-              <a:rPr lang="en-US" sz="2800" dirty="0"/>
-              <a:t> : “Je </a:t>
-            </a:r>
-            <a:r>
-              <a:rPr lang="en-US" sz="2800" dirty="0" err="1"/>
-              <a:t>sais</a:t>
-            </a:r>
-            <a:r>
-              <a:rPr lang="en-US" sz="2800" dirty="0"/>
-              <a:t> pas je suis sur le Front”</a:t>
-            </a:r>
-          </a:p>
-        </p:txBody>
-      </p:sp>
-      <p:sp>
-        <p:nvSpPr>
           <p:cNvPr id="6" name="ZoneTexte 5">
             <a:extLst>
               <a:ext uri="{FF2B5EF4-FFF2-40B4-BE49-F238E27FC236}">
@@ -7479,6 +7432,53 @@
             <a:r>
               <a:rPr lang="en-US" sz="2800" dirty="0"/>
               <a:t> !”</a:t>
+            </a:r>
+          </a:p>
+        </p:txBody>
+      </p:sp>
+      <p:sp>
+        <p:nvSpPr>
+          <p:cNvPr id="12" name="ZoneTexte 11">
+            <a:extLst>
+              <a:ext uri="{FF2B5EF4-FFF2-40B4-BE49-F238E27FC236}">
+                <a16:creationId xmlns:a16="http://schemas.microsoft.com/office/drawing/2014/main" id="{D714D5C2-5AC6-8BCC-95D0-BF0B79A1325B}"/>
+              </a:ext>
+            </a:extLst>
+          </p:cNvPr>
+          <p:cNvSpPr txBox="1"/>
+          <p:nvPr/>
+        </p:nvSpPr>
+        <p:spPr>
+          <a:xfrm>
+            <a:off x="1090536" y="2077682"/>
+            <a:ext cx="6083996" cy="523220"/>
+          </a:xfrm>
+          <a:prstGeom prst="rect">
+            <a:avLst/>
+          </a:prstGeom>
+          <a:noFill/>
+        </p:spPr>
+        <p:txBody>
+          <a:bodyPr wrap="square" rtlCol="0">
+            <a:spAutoFit/>
+          </a:bodyPr>
+          <a:lstStyle/>
+          <a:p>
+            <a:r>
+              <a:rPr lang="en-US" sz="2800" dirty="0" err="1"/>
+              <a:t>Titouan</a:t>
+            </a:r>
+            <a:r>
+              <a:rPr lang="en-US" sz="2800" dirty="0"/>
+              <a:t> : “Je </a:t>
+            </a:r>
+            <a:r>
+              <a:rPr lang="en-US" sz="2800" dirty="0" err="1"/>
+              <a:t>sais</a:t>
+            </a:r>
+            <a:r>
+              <a:rPr lang="en-US" sz="2800" dirty="0"/>
+              <a:t> pas je suis sur le Front”</a:t>
             </a:r>
           </a:p>
         </p:txBody>
@@ -7595,7 +7595,7 @@
         </p:nvSpPr>
         <p:spPr>
           <a:xfrm>
-            <a:off x="1090536" y="1981443"/>
+            <a:off x="1090536" y="2077682"/>
             <a:ext cx="6083996" cy="523220"/>
           </a:xfrm>
           <a:prstGeom prst="rect">
@@ -7830,53 +7830,6 @@
       </p:sp>
       <p:sp>
         <p:nvSpPr>
-          <p:cNvPr id="5" name="ZoneTexte 4">
-            <a:extLst>
-              <a:ext uri="{FF2B5EF4-FFF2-40B4-BE49-F238E27FC236}">
-                <a16:creationId xmlns:a16="http://schemas.microsoft.com/office/drawing/2014/main" id="{1F37CFFB-FB7B-72CF-1200-530604028B94}"/>
-              </a:ext>
-            </a:extLst>
-          </p:cNvPr>
-          <p:cNvSpPr txBox="1"/>
-          <p:nvPr/>
-        </p:nvSpPr>
-        <p:spPr>
-          <a:xfrm>
-            <a:off x="1090536" y="1981443"/>
-            <a:ext cx="6083996" cy="523220"/>
-          </a:xfrm>
-          <a:prstGeom prst="rect">
-            <a:avLst/>
-          </a:prstGeom>
-          <a:noFill/>
-        </p:spPr>
-        <p:txBody>
-          <a:bodyPr wrap="square" rtlCol="0">
-            <a:spAutoFit/>
-          </a:bodyPr>
-          <a:lstStyle/>
-          <a:p>
-            <a:r>
-              <a:rPr lang="en-US" sz="2800" dirty="0" err="1"/>
-              <a:t>Titouan</a:t>
-            </a:r>
-            <a:r>
-              <a:rPr lang="en-US" sz="2800" dirty="0"/>
-              <a:t> : “Je </a:t>
-            </a:r>
-            <a:r>
-              <a:rPr lang="en-US" sz="2800" dirty="0" err="1"/>
-              <a:t>sais</a:t>
-            </a:r>
-            <a:r>
-              <a:rPr lang="en-US" sz="2800" dirty="0"/>
-              <a:t> pas je suis sur le Front”</a:t>
-            </a:r>
-          </a:p>
-        </p:txBody>
-      </p:sp>
-      <p:sp>
-        <p:nvSpPr>
           <p:cNvPr id="6" name="ZoneTexte 5">
             <a:extLst>
               <a:ext uri="{FF2B5EF4-FFF2-40B4-BE49-F238E27FC236}">
@@ -8024,6 +7977,53 @@
             <a:r>
               <a:rPr lang="en-US" sz="2800" dirty="0"/>
               <a:t>)</a:t>
+            </a:r>
+          </a:p>
+        </p:txBody>
+      </p:sp>
+      <p:sp>
+        <p:nvSpPr>
+          <p:cNvPr id="4" name="ZoneTexte 3">
+            <a:extLst>
+              <a:ext uri="{FF2B5EF4-FFF2-40B4-BE49-F238E27FC236}">
+                <a16:creationId xmlns:a16="http://schemas.microsoft.com/office/drawing/2014/main" id="{FCDB5093-3F59-4A20-0394-F226738AAE8D}"/>
+              </a:ext>
+            </a:extLst>
+          </p:cNvPr>
+          <p:cNvSpPr txBox="1"/>
+          <p:nvPr/>
+        </p:nvSpPr>
+        <p:spPr>
+          <a:xfrm>
+            <a:off x="1090536" y="2077682"/>
+            <a:ext cx="6083996" cy="523220"/>
+          </a:xfrm>
+          <a:prstGeom prst="rect">
+            <a:avLst/>
+          </a:prstGeom>
+          <a:noFill/>
+        </p:spPr>
+        <p:txBody>
+          <a:bodyPr wrap="square" rtlCol="0">
+            <a:spAutoFit/>
+          </a:bodyPr>
+          <a:lstStyle/>
+          <a:p>
+            <a:r>
+              <a:rPr lang="en-US" sz="2800" dirty="0" err="1"/>
+              <a:t>Titouan</a:t>
+            </a:r>
+            <a:r>
+              <a:rPr lang="en-US" sz="2800" dirty="0"/>
+              <a:t> : “Je </a:t>
+            </a:r>
+            <a:r>
+              <a:rPr lang="en-US" sz="2800" dirty="0" err="1"/>
+              <a:t>sais</a:t>
+            </a:r>
+            <a:r>
+              <a:rPr lang="en-US" sz="2800" dirty="0"/>
+              <a:t> pas je suis sur le Front”</a:t>
             </a:r>
           </a:p>
         </p:txBody>
@@ -8140,7 +8140,7 @@
         </p:nvSpPr>
         <p:spPr>
           <a:xfrm>
-            <a:off x="1090536" y="1981443"/>
+            <a:off x="1090536" y="2082145"/>
             <a:ext cx="6083996" cy="523220"/>
           </a:xfrm>
           <a:prstGeom prst="rect">

</xml_diff>